<commit_message>
Add local street generation to ExRoadGenerator.
</commit_message>
<xml_diff>
--- a/doc/results_20140317/Example Cities.pptx
+++ b/doc/results_20140317/Example Cities.pptx
@@ -307,7 +307,7 @@
           <a:p>
             <a:fld id="{41DCE4BF-701F-4B31-9513-58B8BCEFB514}" type="datetimeFigureOut">
               <a:rPr lang="en-US" smtClean="0"/>
-              <a:t>3/17/2014</a:t>
+              <a:t>3/28/2014</a:t>
             </a:fld>
             <a:endParaRPr lang="en-US"/>
           </a:p>
@@ -477,7 +477,7 @@
           <a:p>
             <a:fld id="{41DCE4BF-701F-4B31-9513-58B8BCEFB514}" type="datetimeFigureOut">
               <a:rPr lang="en-US" smtClean="0"/>
-              <a:t>3/17/2014</a:t>
+              <a:t>3/28/2014</a:t>
             </a:fld>
             <a:endParaRPr lang="en-US"/>
           </a:p>
@@ -657,7 +657,7 @@
           <a:p>
             <a:fld id="{41DCE4BF-701F-4B31-9513-58B8BCEFB514}" type="datetimeFigureOut">
               <a:rPr lang="en-US" smtClean="0"/>
-              <a:t>3/17/2014</a:t>
+              <a:t>3/28/2014</a:t>
             </a:fld>
             <a:endParaRPr lang="en-US"/>
           </a:p>
@@ -827,7 +827,7 @@
           <a:p>
             <a:fld id="{41DCE4BF-701F-4B31-9513-58B8BCEFB514}" type="datetimeFigureOut">
               <a:rPr lang="en-US" smtClean="0"/>
-              <a:t>3/17/2014</a:t>
+              <a:t>3/28/2014</a:t>
             </a:fld>
             <a:endParaRPr lang="en-US"/>
           </a:p>
@@ -1073,7 +1073,7 @@
           <a:p>
             <a:fld id="{41DCE4BF-701F-4B31-9513-58B8BCEFB514}" type="datetimeFigureOut">
               <a:rPr lang="en-US" smtClean="0"/>
-              <a:t>3/17/2014</a:t>
+              <a:t>3/28/2014</a:t>
             </a:fld>
             <a:endParaRPr lang="en-US"/>
           </a:p>
@@ -1361,7 +1361,7 @@
           <a:p>
             <a:fld id="{41DCE4BF-701F-4B31-9513-58B8BCEFB514}" type="datetimeFigureOut">
               <a:rPr lang="en-US" smtClean="0"/>
-              <a:t>3/17/2014</a:t>
+              <a:t>3/28/2014</a:t>
             </a:fld>
             <a:endParaRPr lang="en-US"/>
           </a:p>
@@ -1783,7 +1783,7 @@
           <a:p>
             <a:fld id="{41DCE4BF-701F-4B31-9513-58B8BCEFB514}" type="datetimeFigureOut">
               <a:rPr lang="en-US" smtClean="0"/>
-              <a:t>3/17/2014</a:t>
+              <a:t>3/28/2014</a:t>
             </a:fld>
             <a:endParaRPr lang="en-US"/>
           </a:p>
@@ -1901,7 +1901,7 @@
           <a:p>
             <a:fld id="{41DCE4BF-701F-4B31-9513-58B8BCEFB514}" type="datetimeFigureOut">
               <a:rPr lang="en-US" smtClean="0"/>
-              <a:t>3/17/2014</a:t>
+              <a:t>3/28/2014</a:t>
             </a:fld>
             <a:endParaRPr lang="en-US"/>
           </a:p>
@@ -1996,7 +1996,7 @@
           <a:p>
             <a:fld id="{41DCE4BF-701F-4B31-9513-58B8BCEFB514}" type="datetimeFigureOut">
               <a:rPr lang="en-US" smtClean="0"/>
-              <a:t>3/17/2014</a:t>
+              <a:t>3/28/2014</a:t>
             </a:fld>
             <a:endParaRPr lang="en-US"/>
           </a:p>
@@ -2273,7 +2273,7 @@
           <a:p>
             <a:fld id="{41DCE4BF-701F-4B31-9513-58B8BCEFB514}" type="datetimeFigureOut">
               <a:rPr lang="en-US" smtClean="0"/>
-              <a:t>3/17/2014</a:t>
+              <a:t>3/28/2014</a:t>
             </a:fld>
             <a:endParaRPr lang="en-US"/>
           </a:p>
@@ -2526,7 +2526,7 @@
           <a:p>
             <a:fld id="{41DCE4BF-701F-4B31-9513-58B8BCEFB514}" type="datetimeFigureOut">
               <a:rPr lang="en-US" smtClean="0"/>
-              <a:t>3/17/2014</a:t>
+              <a:t>3/28/2014</a:t>
             </a:fld>
             <a:endParaRPr lang="en-US"/>
           </a:p>
@@ -2739,7 +2739,7 @@
           <a:p>
             <a:fld id="{41DCE4BF-701F-4B31-9513-58B8BCEFB514}" type="datetimeFigureOut">
               <a:rPr lang="en-US" smtClean="0"/>
-              <a:t>3/17/2014</a:t>
+              <a:t>3/28/2014</a:t>
             </a:fld>
             <a:endParaRPr lang="en-US"/>
           </a:p>
@@ -11894,9 +11894,45 @@
           <a:chExt cx="0" cy="0"/>
         </a:xfrm>
       </p:grpSpPr>
+      <p:sp>
+        <p:nvSpPr>
+          <p:cNvPr id="2" name="TextBox 1"/>
+          <p:cNvSpPr txBox="1"/>
+          <p:nvPr/>
+        </p:nvSpPr>
+        <p:spPr>
+          <a:xfrm>
+            <a:off x="152400" y="152400"/>
+            <a:ext cx="2597249" cy="646331"/>
+          </a:xfrm>
+          <a:prstGeom prst="rect">
+            <a:avLst/>
+          </a:prstGeom>
+          <a:noFill/>
+        </p:spPr>
+        <p:txBody>
+          <a:bodyPr wrap="none" rtlCol="0">
+            <a:spAutoFit/>
+          </a:bodyPr>
+          <a:lstStyle/>
+          <a:p>
+            <a:r>
+              <a:rPr lang="en-US" dirty="0" smtClean="0"/>
+              <a:t>feature_tokyo_1.xml</a:t>
+            </a:r>
+          </a:p>
+          <a:p>
+            <a:r>
+              <a:rPr lang="en-US" dirty="0" smtClean="0"/>
+              <a:t>Commercial &amp; Residential</a:t>
+            </a:r>
+            <a:endParaRPr lang="en-US" dirty="0"/>
+          </a:p>
+        </p:txBody>
+      </p:sp>
       <p:pic>
         <p:nvPicPr>
-          <p:cNvPr id="1026" name="Picture 2"/>
+          <p:cNvPr id="3" name="Picture 2"/>
           <p:cNvPicPr>
             <a:picLocks noChangeAspect="1" noChangeArrowheads="1"/>
           </p:cNvPicPr>
@@ -11917,8 +11953,8 @@
         </p:blipFill>
         <p:spPr bwMode="auto">
           <a:xfrm>
-            <a:off x="1219200" y="990600"/>
-            <a:ext cx="6477000" cy="5582714"/>
+            <a:off x="1219200" y="914400"/>
+            <a:ext cx="6467475" cy="5792124"/>
           </a:xfrm>
           <a:prstGeom prst="rect">
             <a:avLst/>
@@ -11948,42 +11984,6 @@
           </a:extLst>
         </p:spPr>
       </p:pic>
-      <p:sp>
-        <p:nvSpPr>
-          <p:cNvPr id="2" name="TextBox 1"/>
-          <p:cNvSpPr txBox="1"/>
-          <p:nvPr/>
-        </p:nvSpPr>
-        <p:spPr>
-          <a:xfrm>
-            <a:off x="152400" y="152400"/>
-            <a:ext cx="2597249" cy="646331"/>
-          </a:xfrm>
-          <a:prstGeom prst="rect">
-            <a:avLst/>
-          </a:prstGeom>
-          <a:noFill/>
-        </p:spPr>
-        <p:txBody>
-          <a:bodyPr wrap="none" rtlCol="0">
-            <a:spAutoFit/>
-          </a:bodyPr>
-          <a:lstStyle/>
-          <a:p>
-            <a:r>
-              <a:rPr lang="en-US" dirty="0" smtClean="0"/>
-              <a:t>feature_tokyo_1.xml</a:t>
-            </a:r>
-          </a:p>
-          <a:p>
-            <a:r>
-              <a:rPr lang="en-US" dirty="0" smtClean="0"/>
-              <a:t>Commercial &amp; Residential</a:t>
-            </a:r>
-            <a:endParaRPr lang="en-US" dirty="0"/>
-          </a:p>
-        </p:txBody>
-      </p:sp>
     </p:spTree>
     <p:extLst>
       <p:ext uri="{BB962C8B-B14F-4D97-AF65-F5344CB8AC3E}">

</xml_diff>